<commit_message>
All AMO40 are solved
</commit_message>
<xml_diff>
--- a/AMO40-2013-EN/amo40-2013-en.pptx
+++ b/AMO40-2013-EN/amo40-2013-en.pptx
@@ -25,6 +25,7 @@
     <p:sldId id="274" r:id="rId19"/>
     <p:sldId id="275" r:id="rId20"/>
     <p:sldId id="276" r:id="rId21"/>
+    <p:sldId id="277" r:id="rId22"/>
   </p:sldIdLst>
   <p:sldSz cx="9144000" cy="6858000" type="screen4x3"/>
   <p:notesSz cx="6858000" cy="9144000"/>
@@ -123,6 +124,41 @@
       </a:defRPr>
     </a:lvl9pPr>
   </p:defaultTextStyle>
+  <p:extLst>
+    <p:ext uri="{521415D9-36F7-43E2-AB2F-B90AF26B5E84}">
+      <p14:sectionLst xmlns:p14="http://schemas.microsoft.com/office/powerpoint/2010/main">
+        <p14:section name="Default Section" id="{5156B4D5-C39B-49F4-AE9F-BD5CEA71A783}">
+          <p14:sldIdLst>
+            <p14:sldId id="257"/>
+            <p14:sldId id="258"/>
+            <p14:sldId id="259"/>
+            <p14:sldId id="260"/>
+            <p14:sldId id="261"/>
+            <p14:sldId id="262"/>
+            <p14:sldId id="263"/>
+            <p14:sldId id="264"/>
+            <p14:sldId id="265"/>
+            <p14:sldId id="266"/>
+            <p14:sldId id="267"/>
+            <p14:sldId id="268"/>
+            <p14:sldId id="269"/>
+            <p14:sldId id="270"/>
+            <p14:sldId id="271"/>
+            <p14:sldId id="272"/>
+            <p14:sldId id="273"/>
+            <p14:sldId id="274"/>
+            <p14:sldId id="275"/>
+            <p14:sldId id="276"/>
+          </p14:sldIdLst>
+        </p14:section>
+        <p14:section name="Untitled Section" id="{DED29C9A-D479-4EFF-9223-8D1D4F8CBE59}">
+          <p14:sldIdLst>
+            <p14:sldId id="277"/>
+          </p14:sldIdLst>
+        </p14:section>
+      </p14:sectionLst>
+    </p:ext>
+  </p:extLst>
 </p:presentation>
 </file>
 
@@ -307,7 +343,7 @@
           <a:p>
             <a:fld id="{B178DB29-61E5-46A0-854A-CED32E03BDEB}" type="datetimeFigureOut">
               <a:rPr lang="en-GB" smtClean="0"/>
-              <a:t>2014-04-25</a:t>
+              <a:t>2014-07-07</a:t>
             </a:fld>
             <a:endParaRPr lang="en-GB"/>
           </a:p>
@@ -477,7 +513,7 @@
           <a:p>
             <a:fld id="{B178DB29-61E5-46A0-854A-CED32E03BDEB}" type="datetimeFigureOut">
               <a:rPr lang="en-GB" smtClean="0"/>
-              <a:t>2014-04-25</a:t>
+              <a:t>2014-07-07</a:t>
             </a:fld>
             <a:endParaRPr lang="en-GB"/>
           </a:p>
@@ -657,7 +693,7 @@
           <a:p>
             <a:fld id="{B178DB29-61E5-46A0-854A-CED32E03BDEB}" type="datetimeFigureOut">
               <a:rPr lang="en-GB" smtClean="0"/>
-              <a:t>2014-04-25</a:t>
+              <a:t>2014-07-07</a:t>
             </a:fld>
             <a:endParaRPr lang="en-GB"/>
           </a:p>
@@ -827,7 +863,7 @@
           <a:p>
             <a:fld id="{B178DB29-61E5-46A0-854A-CED32E03BDEB}" type="datetimeFigureOut">
               <a:rPr lang="en-GB" smtClean="0"/>
-              <a:t>2014-04-25</a:t>
+              <a:t>2014-07-07</a:t>
             </a:fld>
             <a:endParaRPr lang="en-GB"/>
           </a:p>
@@ -1073,7 +1109,7 @@
           <a:p>
             <a:fld id="{B178DB29-61E5-46A0-854A-CED32E03BDEB}" type="datetimeFigureOut">
               <a:rPr lang="en-GB" smtClean="0"/>
-              <a:t>2014-04-25</a:t>
+              <a:t>2014-07-07</a:t>
             </a:fld>
             <a:endParaRPr lang="en-GB"/>
           </a:p>
@@ -1361,7 +1397,7 @@
           <a:p>
             <a:fld id="{B178DB29-61E5-46A0-854A-CED32E03BDEB}" type="datetimeFigureOut">
               <a:rPr lang="en-GB" smtClean="0"/>
-              <a:t>2014-04-25</a:t>
+              <a:t>2014-07-07</a:t>
             </a:fld>
             <a:endParaRPr lang="en-GB"/>
           </a:p>
@@ -1783,7 +1819,7 @@
           <a:p>
             <a:fld id="{B178DB29-61E5-46A0-854A-CED32E03BDEB}" type="datetimeFigureOut">
               <a:rPr lang="en-GB" smtClean="0"/>
-              <a:t>2014-04-25</a:t>
+              <a:t>2014-07-07</a:t>
             </a:fld>
             <a:endParaRPr lang="en-GB"/>
           </a:p>
@@ -1901,7 +1937,7 @@
           <a:p>
             <a:fld id="{B178DB29-61E5-46A0-854A-CED32E03BDEB}" type="datetimeFigureOut">
               <a:rPr lang="en-GB" smtClean="0"/>
-              <a:t>2014-04-25</a:t>
+              <a:t>2014-07-07</a:t>
             </a:fld>
             <a:endParaRPr lang="en-GB"/>
           </a:p>
@@ -1996,7 +2032,7 @@
           <a:p>
             <a:fld id="{B178DB29-61E5-46A0-854A-CED32E03BDEB}" type="datetimeFigureOut">
               <a:rPr lang="en-GB" smtClean="0"/>
-              <a:t>2014-04-25</a:t>
+              <a:t>2014-07-07</a:t>
             </a:fld>
             <a:endParaRPr lang="en-GB"/>
           </a:p>
@@ -2273,7 +2309,7 @@
           <a:p>
             <a:fld id="{B178DB29-61E5-46A0-854A-CED32E03BDEB}" type="datetimeFigureOut">
               <a:rPr lang="en-GB" smtClean="0"/>
-              <a:t>2014-04-25</a:t>
+              <a:t>2014-07-07</a:t>
             </a:fld>
             <a:endParaRPr lang="en-GB"/>
           </a:p>
@@ -2526,7 +2562,7 @@
           <a:p>
             <a:fld id="{B178DB29-61E5-46A0-854A-CED32E03BDEB}" type="datetimeFigureOut">
               <a:rPr lang="en-GB" smtClean="0"/>
-              <a:t>2014-04-25</a:t>
+              <a:t>2014-07-07</a:t>
             </a:fld>
             <a:endParaRPr lang="en-GB"/>
           </a:p>
@@ -2739,7 +2775,7 @@
           <a:p>
             <a:fld id="{B178DB29-61E5-46A0-854A-CED32E03BDEB}" type="datetimeFigureOut">
               <a:rPr lang="en-GB" smtClean="0"/>
-              <a:t>2014-04-25</a:t>
+              <a:t>2014-07-07</a:t>
             </a:fld>
             <a:endParaRPr lang="en-GB"/>
           </a:p>
@@ -4312,6 +4348,255 @@
   <p:clrMapOvr>
     <a:masterClrMapping/>
   </p:clrMapOvr>
+</p:sld>
+</file>
+
+<file path=ppt/slides/slide21.xml><?xml version="1.0" encoding="utf-8"?>
+<p:sld xmlns:a="http://schemas.openxmlformats.org/drawingml/2006/main" xmlns:r="http://schemas.openxmlformats.org/officeDocument/2006/relationships" xmlns:p="http://schemas.openxmlformats.org/presentationml/2006/main">
+  <p:cSld>
+    <p:spTree>
+      <p:nvGrpSpPr>
+        <p:cNvPr id="1" name=""/>
+        <p:cNvGrpSpPr/>
+        <p:nvPr/>
+      </p:nvGrpSpPr>
+      <p:grpSpPr>
+        <a:xfrm>
+          <a:off x="0" y="0"/>
+          <a:ext cx="0" cy="0"/>
+          <a:chOff x="0" y="0"/>
+          <a:chExt cx="0" cy="0"/>
+        </a:xfrm>
+      </p:grpSpPr>
+      <p:sp>
+        <p:nvSpPr>
+          <p:cNvPr id="2" name="Title 1"/>
+          <p:cNvSpPr>
+            <a:spLocks noGrp="1"/>
+          </p:cNvSpPr>
+          <p:nvPr>
+            <p:ph type="title"/>
+          </p:nvPr>
+        </p:nvSpPr>
+        <p:spPr/>
+        <p:txBody>
+          <a:bodyPr>
+            <a:noAutofit/>
+          </a:bodyPr>
+          <a:lstStyle/>
+          <a:p>
+            <a:r>
+              <a:rPr lang="en-US" sz="2800" dirty="0" err="1" smtClean="0"/>
+              <a:t>Latvijas</a:t>
+            </a:r>
+            <a:r>
+              <a:rPr lang="en-US" sz="2800" dirty="0" smtClean="0"/>
+              <a:t> 40.atkl</a:t>
+            </a:r>
+            <a:r>
+              <a:rPr lang="lv-LV" sz="2800" dirty="0" smtClean="0"/>
+              <a:t>ātā matemātikas olimpiāde (2013-04-28)</a:t>
+            </a:r>
+            <a:br>
+              <a:rPr lang="lv-LV" sz="2800" dirty="0" smtClean="0"/>
+            </a:br>
+            <a:r>
+              <a:rPr lang="lv-LV" sz="2800" dirty="0" smtClean="0"/>
+              <a:t>12.klases 2.uzdevums</a:t>
+            </a:r>
+            <a:endParaRPr lang="en-GB" sz="2800" dirty="0"/>
+          </a:p>
+        </p:txBody>
+      </p:sp>
+      <p:sp>
+        <p:nvSpPr>
+          <p:cNvPr id="3" name="Content Placeholder 2"/>
+          <p:cNvSpPr>
+            <a:spLocks noGrp="1"/>
+          </p:cNvSpPr>
+          <p:nvPr>
+            <p:ph idx="1"/>
+          </p:nvPr>
+        </p:nvSpPr>
+        <p:spPr/>
+        <p:txBody>
+          <a:bodyPr>
+            <a:normAutofit/>
+          </a:bodyPr>
+          <a:lstStyle/>
+          <a:p>
+            <a:pPr marL="0" indent="0">
+              <a:buNone/>
+            </a:pPr>
+            <a:r>
+              <a:rPr lang="lv-LV" sz="3600" dirty="0"/>
+              <a:t>Trijstūrī </a:t>
+            </a:r>
+            <a:r>
+              <a:rPr lang="lv-LV" sz="3600" i="1" dirty="0"/>
+              <a:t>ABC</a:t>
+            </a:r>
+            <a:r>
+              <a:rPr lang="lv-LV" sz="3600" dirty="0"/>
+              <a:t> punkti </a:t>
+            </a:r>
+            <a:r>
+              <a:rPr lang="lv-LV" sz="3600" i="1" dirty="0"/>
+              <a:t>M</a:t>
+            </a:r>
+            <a:r>
+              <a:rPr lang="lv-LV" sz="3600" dirty="0"/>
+              <a:t>, </a:t>
+            </a:r>
+            <a:r>
+              <a:rPr lang="lv-LV" sz="3600" i="1" dirty="0"/>
+              <a:t>N</a:t>
+            </a:r>
+            <a:r>
+              <a:rPr lang="lv-LV" sz="3600" dirty="0"/>
+              <a:t> un </a:t>
+            </a:r>
+            <a:r>
+              <a:rPr lang="lv-LV" sz="3600" i="1" dirty="0"/>
+              <a:t>K</a:t>
+            </a:r>
+            <a:r>
+              <a:rPr lang="lv-LV" sz="3600" dirty="0"/>
+              <a:t> ir attiecīgi malu </a:t>
+            </a:r>
+            <a:r>
+              <a:rPr lang="lv-LV" sz="3600" i="1" dirty="0"/>
+              <a:t>AB</a:t>
+            </a:r>
+            <a:r>
+              <a:rPr lang="lv-LV" sz="3600" dirty="0"/>
+              <a:t>, </a:t>
+            </a:r>
+            <a:r>
+              <a:rPr lang="lv-LV" sz="3600" i="1" dirty="0"/>
+              <a:t>BC</a:t>
+            </a:r>
+            <a:r>
+              <a:rPr lang="lv-LV" sz="3600" dirty="0"/>
+              <a:t> un </a:t>
+            </a:r>
+            <a:r>
+              <a:rPr lang="lv-LV" sz="3600" i="1" dirty="0" smtClean="0"/>
+              <a:t>CA</a:t>
+            </a:r>
+            <a:r>
+              <a:rPr lang="lv-LV" sz="3600" dirty="0" smtClean="0"/>
+              <a:t> viduspunkti</a:t>
+            </a:r>
+            <a:r>
+              <a:rPr lang="lv-LV" sz="3600" dirty="0"/>
+              <a:t>. Ir novilktas trīs riņķa līnijas: caur punktiem </a:t>
+            </a:r>
+            <a:r>
+              <a:rPr lang="lv-LV" sz="3600" i="1" dirty="0"/>
+              <a:t>K</a:t>
+            </a:r>
+            <a:r>
+              <a:rPr lang="lv-LV" sz="3600" dirty="0"/>
+              <a:t>, </a:t>
+            </a:r>
+            <a:r>
+              <a:rPr lang="lv-LV" sz="3600" i="1" dirty="0"/>
+              <a:t>A</a:t>
+            </a:r>
+            <a:r>
+              <a:rPr lang="lv-LV" sz="3600" dirty="0"/>
+              <a:t>, </a:t>
+            </a:r>
+            <a:r>
+              <a:rPr lang="lv-LV" sz="3600" i="1" dirty="0" smtClean="0"/>
+              <a:t>M</a:t>
+            </a:r>
+            <a:r>
+              <a:rPr lang="lv-LV" sz="3600" dirty="0" smtClean="0"/>
+              <a:t>; caur </a:t>
+            </a:r>
+            <a:r>
+              <a:rPr lang="lv-LV" sz="3600" dirty="0"/>
+              <a:t>punktiem </a:t>
+            </a:r>
+            <a:r>
+              <a:rPr lang="lv-LV" sz="3600" i="1" dirty="0"/>
+              <a:t>M</a:t>
+            </a:r>
+            <a:r>
+              <a:rPr lang="lv-LV" sz="3600" dirty="0"/>
+              <a:t>, </a:t>
+            </a:r>
+            <a:r>
+              <a:rPr lang="lv-LV" sz="3600" i="1" dirty="0"/>
+              <a:t>B</a:t>
+            </a:r>
+            <a:r>
+              <a:rPr lang="lv-LV" sz="3600" dirty="0"/>
+              <a:t>, </a:t>
+            </a:r>
+            <a:r>
+              <a:rPr lang="lv-LV" sz="3600" i="1" dirty="0"/>
+              <a:t>N</a:t>
+            </a:r>
+            <a:r>
+              <a:rPr lang="lv-LV" sz="3600" dirty="0"/>
+              <a:t>; caur punktiem </a:t>
+            </a:r>
+            <a:r>
+              <a:rPr lang="lv-LV" sz="3600" i="1" dirty="0"/>
+              <a:t>N</a:t>
+            </a:r>
+            <a:r>
+              <a:rPr lang="lv-LV" sz="3600" dirty="0"/>
+              <a:t>, </a:t>
+            </a:r>
+            <a:r>
+              <a:rPr lang="lv-LV" sz="3600" i="1" dirty="0"/>
+              <a:t>C</a:t>
+            </a:r>
+            <a:r>
+              <a:rPr lang="lv-LV" sz="3600" dirty="0"/>
+              <a:t>, </a:t>
+            </a:r>
+            <a:r>
+              <a:rPr lang="lv-LV" sz="3600" i="1" dirty="0"/>
+              <a:t>K</a:t>
+            </a:r>
+            <a:r>
+              <a:rPr lang="lv-LV" sz="3600" dirty="0"/>
+              <a:t>. Pierādīt, ka </a:t>
+            </a:r>
+            <a:r>
+              <a:rPr lang="lv-LV" sz="3600" dirty="0" smtClean="0"/>
+              <a:t>visas novilktās </a:t>
+            </a:r>
+            <a:r>
+              <a:rPr lang="lv-LV" sz="3600" dirty="0"/>
+              <a:t>riņķa līnijas krustojas vienā punktā.</a:t>
+            </a:r>
+            <a:endParaRPr lang="en-GB" sz="3600" dirty="0"/>
+          </a:p>
+        </p:txBody>
+      </p:sp>
+    </p:spTree>
+    <p:extLst>
+      <p:ext uri="{BB962C8B-B14F-4D97-AF65-F5344CB8AC3E}">
+        <p14:creationId xmlns:p14="http://schemas.microsoft.com/office/powerpoint/2010/main" val="681453168"/>
+      </p:ext>
+    </p:extLst>
+  </p:cSld>
+  <p:clrMapOvr>
+    <a:masterClrMapping/>
+  </p:clrMapOvr>
+  <p:timing>
+    <p:tnLst>
+      <p:par>
+        <p:cTn id="1" dur="indefinite" restart="never" nodeType="tmRoot"/>
+      </p:par>
+    </p:tnLst>
+  </p:timing>
 </p:sld>
 </file>
 

</xml_diff>